<commit_message>
Added my notes for presentation
</commit_message>
<xml_diff>
--- a/Team Docs/Sprint 2 Presentation.pptx
+++ b/Team Docs/Sprint 2 Presentation.pptx
@@ -237,7 +237,7 @@
           <a:p>
             <a:fld id="{705E03B7-B591-4A2A-B695-014C5A39F13E}" type="datetimeFigureOut">
               <a:rPr lang="en-US"/>
-              <a:t>5/14/2017</a:t>
+              <a:t>5/15/2017</a:t>
             </a:fld>
             <a:endParaRPr/>
           </a:p>
@@ -402,7 +402,7 @@
           <a:p>
             <a:fld id="{67DFBD7B-E4FB-4AA8-9540-FD148073ACB3}" type="datetimeFigureOut">
               <a:rPr lang="en-US"/>
-              <a:t>5/14/2017</a:t>
+              <a:t>5/15/2017</a:t>
             </a:fld>
             <a:endParaRPr/>
           </a:p>
@@ -801,9 +801,43 @@
               <a:buChar char="•"/>
             </a:pPr>
             <a:r>
-              <a:rPr lang="en-CA" dirty="0" err="1"/>
+              <a:rPr lang="en-CA" dirty="0"/>
               <a:t>Raly</a:t>
             </a:r>
+          </a:p>
+          <a:p>
+            <a:r>
+              <a:rPr lang="en-US" sz="1600" kern="1200" dirty="0">
+                <a:solidFill>
+                  <a:schemeClr val="tx1"/>
+                </a:solidFill>
+                <a:effectLst/>
+                <a:latin typeface="+mn-lt"/>
+                <a:ea typeface="+mn-ea"/>
+                <a:cs typeface="+mn-cs"/>
+              </a:rPr>
+              <a:t>Our app is called Grocery Buddy, and for those of you that are unfamiliar</a:t>
+            </a:r>
+          </a:p>
+          <a:p>
+            <a:r>
+              <a:rPr lang="en-US" sz="1600" kern="1200" dirty="0">
+                <a:solidFill>
+                  <a:schemeClr val="tx1"/>
+                </a:solidFill>
+                <a:effectLst/>
+                <a:latin typeface="+mn-lt"/>
+                <a:ea typeface="+mn-ea"/>
+                <a:cs typeface="+mn-cs"/>
+              </a:rPr>
+              <a:t>Grocery Buddy is a shopping list app that tracks your food products and their expiration dates. It helps you plan what you need to buy and make the most of what you have.</a:t>
+            </a:r>
+          </a:p>
+          <a:p>
+            <a:pPr marL="285750" indent="-285750">
+              <a:buFont typeface="Arial" panose="020B0604020202020204" pitchFamily="34" charset="0"/>
+              <a:buChar char="•"/>
+            </a:pPr>
             <a:endParaRPr lang="en-CA" dirty="0"/>
           </a:p>
         </p:txBody>
@@ -889,9 +923,81 @@
           <a:lstStyle/>
           <a:p>
             <a:r>
-              <a:rPr lang="en-CA" dirty="0" err="1"/>
+              <a:rPr lang="en-CA" dirty="0"/>
               <a:t>Raly</a:t>
             </a:r>
+          </a:p>
+          <a:p>
+            <a:r>
+              <a:rPr lang="en-US" sz="1600" kern="1200" dirty="0">
+                <a:solidFill>
+                  <a:schemeClr val="tx1"/>
+                </a:solidFill>
+                <a:effectLst/>
+                <a:latin typeface="+mn-lt"/>
+                <a:ea typeface="+mn-ea"/>
+                <a:cs typeface="+mn-cs"/>
+              </a:rPr>
+              <a:t>Last week, we finished Sprint 1 by meeting all of the preset goals that we set for that iteration. We mainly focused on finishing all of the front-end functionality. </a:t>
+            </a:r>
+          </a:p>
+          <a:p>
+            <a:r>
+              <a:rPr lang="en-US" sz="1600" kern="1200" dirty="0">
+                <a:solidFill>
+                  <a:schemeClr val="tx1"/>
+                </a:solidFill>
+                <a:effectLst/>
+                <a:latin typeface="+mn-lt"/>
+                <a:ea typeface="+mn-ea"/>
+                <a:cs typeface="+mn-cs"/>
+              </a:rPr>
+              <a:t>We finished designing and implementing our User Interface.</a:t>
+            </a:r>
+          </a:p>
+          <a:p>
+            <a:r>
+              <a:rPr lang="en-US" sz="1600" kern="1200" dirty="0">
+                <a:solidFill>
+                  <a:schemeClr val="tx1"/>
+                </a:solidFill>
+                <a:effectLst/>
+                <a:latin typeface="+mn-lt"/>
+                <a:ea typeface="+mn-ea"/>
+                <a:cs typeface="+mn-cs"/>
+              </a:rPr>
+              <a:t>Our app was styled with bootstrap which made it fully responsive.</a:t>
+            </a:r>
+          </a:p>
+          <a:p>
+            <a:r>
+              <a:rPr lang="en-US" sz="1600" kern="1200" dirty="0">
+                <a:solidFill>
+                  <a:schemeClr val="tx1"/>
+                </a:solidFill>
+                <a:effectLst/>
+                <a:latin typeface="+mn-lt"/>
+                <a:ea typeface="+mn-ea"/>
+                <a:cs typeface="+mn-cs"/>
+              </a:rPr>
+              <a:t>Our app was built on an Angular 4 environment allowing Single-Page application</a:t>
+            </a:r>
+          </a:p>
+          <a:p>
+            <a:r>
+              <a:rPr lang="en-US" sz="1600" kern="1200">
+                <a:solidFill>
+                  <a:schemeClr val="tx1"/>
+                </a:solidFill>
+                <a:effectLst/>
+                <a:latin typeface="+mn-lt"/>
+                <a:ea typeface="+mn-ea"/>
+                <a:cs typeface="+mn-cs"/>
+              </a:rPr>
+              <a:t>And we finished coding all of our front-end functionality with JavaScript and currently have them stored within JavaScript objects. </a:t>
+            </a:r>
+          </a:p>
+          <a:p>
             <a:endParaRPr lang="en-CA" dirty="0"/>
           </a:p>
         </p:txBody>
@@ -1875,7 +1981,7 @@
           <a:p>
             <a:fld id="{A7209051-6E81-43E8-9099-FF6A0C3DCFE8}" type="datetime1">
               <a:rPr lang="en-US"/>
-              <a:t>5/14/2017</a:t>
+              <a:t>5/15/2017</a:t>
             </a:fld>
             <a:endParaRPr/>
           </a:p>
@@ -2076,7 +2182,7 @@
           <a:p>
             <a:fld id="{EDCEAB04-7709-4C1E-A61A-74684A0170FC}" type="datetime1">
               <a:rPr lang="en-US"/>
-              <a:t>5/14/2017</a:t>
+              <a:t>5/15/2017</a:t>
             </a:fld>
             <a:endParaRPr/>
           </a:p>
@@ -2626,7 +2732,7 @@
           <a:p>
             <a:fld id="{0C79BD0D-E0B1-4CED-AC65-708AC79EB9CD}" type="datetime1">
               <a:rPr lang="en-US"/>
-              <a:t>5/14/2017</a:t>
+              <a:t>5/15/2017</a:t>
             </a:fld>
             <a:endParaRPr/>
           </a:p>
@@ -2827,7 +2933,7 @@
           <a:p>
             <a:fld id="{0CC3EA6D-DF0B-4D4B-B359-5F1D1D0E30A4}" type="datetime1">
               <a:rPr lang="en-US"/>
-              <a:t>5/14/2017</a:t>
+              <a:t>5/15/2017</a:t>
             </a:fld>
             <a:endParaRPr/>
           </a:p>
@@ -3431,7 +3537,7 @@
           <a:p>
             <a:fld id="{977EDB99-15BC-4479-BAC5-1E502E66917A}" type="datetime1">
               <a:rPr lang="en-US"/>
-              <a:t>5/14/2017</a:t>
+              <a:t>5/15/2017</a:t>
             </a:fld>
             <a:endParaRPr/>
           </a:p>
@@ -3743,7 +3849,7 @@
           <a:p>
             <a:fld id="{4067C2A3-CD19-48AB-9F64-ECCF75182EDD}" type="datetime1">
               <a:rPr lang="en-US"/>
-              <a:t>5/14/2017</a:t>
+              <a:t>5/15/2017</a:t>
             </a:fld>
             <a:endParaRPr/>
           </a:p>
@@ -4205,7 +4311,7 @@
           <a:p>
             <a:fld id="{0363E8C1-7C87-4705-AB97-8CD17D208E3F}" type="datetime1">
               <a:rPr lang="en-US"/>
-              <a:t>5/14/2017</a:t>
+              <a:t>5/15/2017</a:t>
             </a:fld>
             <a:endParaRPr/>
           </a:p>
@@ -4338,7 +4444,7 @@
           <a:p>
             <a:fld id="{E20C624E-DF92-4841-B9B9-DD11AA239B85}" type="datetime1">
               <a:rPr lang="en-US"/>
-              <a:t>5/14/2017</a:t>
+              <a:t>5/15/2017</a:t>
             </a:fld>
             <a:endParaRPr/>
           </a:p>
@@ -4631,7 +4737,7 @@
           <a:p>
             <a:fld id="{FBDA3AE1-4360-4D5B-BDBC-656B872DD533}" type="datetime1">
               <a:rPr lang="en-US"/>
-              <a:t>5/14/2017</a:t>
+              <a:t>5/15/2017</a:t>
             </a:fld>
             <a:endParaRPr/>
           </a:p>
@@ -4930,7 +5036,7 @@
           <a:p>
             <a:fld id="{20990708-46A4-4851-883E-8DFB8939107E}" type="datetime1">
               <a:rPr lang="en-US"/>
-              <a:t>5/14/2017</a:t>
+              <a:t>5/15/2017</a:t>
             </a:fld>
             <a:endParaRPr/>
           </a:p>
@@ -5214,7 +5320,7 @@
           <a:p>
             <a:fld id="{AE88EFFC-86AE-4294-A319-CAFC2651994B}" type="datetime1">
               <a:rPr lang="en-US"/>
-              <a:t>5/14/2017</a:t>
+              <a:t>5/15/2017</a:t>
             </a:fld>
             <a:endParaRPr/>
           </a:p>
@@ -5796,7 +5902,7 @@
             <a:fld id="{D29E8617-6EA8-4B97-A5E8-E18E98765EE2}" type="datetime1">
               <a:rPr lang="en-US"/>
               <a:pPr/>
-              <a:t>5/14/2017</a:t>
+              <a:t>5/15/2017</a:t>
             </a:fld>
             <a:endParaRPr dirty="0"/>
           </a:p>
@@ -10886,15 +10992,6 @@
 </file>
 
 <file path=customXml/item2.xml><?xml version="1.0" encoding="utf-8"?>
-<?mso-contentType ?>
-<FormTemplates xmlns="http://schemas.microsoft.com/sharepoint/v3/contenttype/forms">
-  <Display>DocumentLibraryForm</Display>
-  <Edit>DocumentLibraryForm</Edit>
-  <New>DocumentLibraryForm</New>
-</FormTemplates>
-</file>
-
-<file path=customXml/item3.xml><?xml version="1.0" encoding="utf-8"?>
 <p:properties xmlns:p="http://schemas.microsoft.com/office/2006/metadata/properties" xmlns:xsi="http://www.w3.org/2001/XMLSchema-instance" xmlns:pc="http://schemas.microsoft.com/office/infopath/2007/PartnerControls">
   <documentManagement>
     <VSO_x0020_item_x0020_id xmlns="40262f94-9f35-4ac3-9a90-690165a166b7" xsi:nil="true"/>
@@ -10903,6 +11000,15 @@
     <Template_x0020_details xmlns="40262f94-9f35-4ac3-9a90-690165a166b7" xsi:nil="true"/>
   </documentManagement>
 </p:properties>
+</file>
+
+<file path=customXml/item3.xml><?xml version="1.0" encoding="utf-8"?>
+<?mso-contentType ?>
+<FormTemplates xmlns="http://schemas.microsoft.com/sharepoint/v3/contenttype/forms">
+  <Display>DocumentLibraryForm</Display>
+  <Edit>DocumentLibraryForm</Edit>
+  <New>DocumentLibraryForm</New>
+</FormTemplates>
 </file>
 
 <file path=customXml/itemProps1.xml><?xml version="1.0" encoding="utf-8"?>
@@ -10925,14 +11031,6 @@
 </file>
 
 <file path=customXml/itemProps2.xml><?xml version="1.0" encoding="utf-8"?>
-<ds:datastoreItem xmlns:ds="http://schemas.openxmlformats.org/officeDocument/2006/customXml" ds:itemID="{308942AA-0721-4324-BC2C-A3CB43F24E71}">
-  <ds:schemaRefs>
-    <ds:schemaRef ds:uri="http://schemas.microsoft.com/sharepoint/v3/contenttype/forms"/>
-  </ds:schemaRefs>
-</ds:datastoreItem>
-</file>
-
-<file path=customXml/itemProps3.xml><?xml version="1.0" encoding="utf-8"?>
 <ds:datastoreItem xmlns:ds="http://schemas.openxmlformats.org/officeDocument/2006/customXml" ds:itemID="{5E700CCB-20BA-4760-AB9F-AC3B63ED32E0}">
   <ds:schemaRefs>
     <ds:schemaRef ds:uri="http://purl.org/dc/terms/"/>
@@ -10947,4 +11045,12 @@
     <ds:schemaRef ds:uri="http://www.w3.org/XML/1998/namespace"/>
   </ds:schemaRefs>
 </ds:datastoreItem>
+</file>
+
+<file path=customXml/itemProps3.xml><?xml version="1.0" encoding="utf-8"?>
+<ds:datastoreItem xmlns:ds="http://schemas.openxmlformats.org/officeDocument/2006/customXml" ds:itemID="{308942AA-0721-4324-BC2C-A3CB43F24E71}">
+  <ds:schemaRefs>
+    <ds:schemaRef ds:uri="http://schemas.microsoft.com/sharepoint/v3/contenttype/forms"/>
+  </ds:schemaRefs>
+</ds:datastoreItem>
 </file>
</xml_diff>

<commit_message>
changes to old ppt
</commit_message>
<xml_diff>
--- a/Team Docs/Sprint 2 Presentation.pptx
+++ b/Team Docs/Sprint 2 Presentation.pptx
@@ -237,7 +237,7 @@
           <a:p>
             <a:fld id="{705E03B7-B591-4A2A-B695-014C5A39F13E}" type="datetimeFigureOut">
               <a:rPr lang="en-US"/>
-              <a:t>5/14/2017</a:t>
+              <a:t>5/15/2017</a:t>
             </a:fld>
             <a:endParaRPr/>
           </a:p>
@@ -402,7 +402,7 @@
           <a:p>
             <a:fld id="{67DFBD7B-E4FB-4AA8-9540-FD148073ACB3}" type="datetimeFigureOut">
               <a:rPr lang="en-US"/>
-              <a:t>5/14/2017</a:t>
+              <a:t>5/15/2017</a:t>
             </a:fld>
             <a:endParaRPr/>
           </a:p>
@@ -1875,7 +1875,7 @@
           <a:p>
             <a:fld id="{A7209051-6E81-43E8-9099-FF6A0C3DCFE8}" type="datetime1">
               <a:rPr lang="en-US"/>
-              <a:t>5/14/2017</a:t>
+              <a:t>5/15/2017</a:t>
             </a:fld>
             <a:endParaRPr/>
           </a:p>
@@ -2076,7 +2076,7 @@
           <a:p>
             <a:fld id="{EDCEAB04-7709-4C1E-A61A-74684A0170FC}" type="datetime1">
               <a:rPr lang="en-US"/>
-              <a:t>5/14/2017</a:t>
+              <a:t>5/15/2017</a:t>
             </a:fld>
             <a:endParaRPr/>
           </a:p>
@@ -2626,7 +2626,7 @@
           <a:p>
             <a:fld id="{0C79BD0D-E0B1-4CED-AC65-708AC79EB9CD}" type="datetime1">
               <a:rPr lang="en-US"/>
-              <a:t>5/14/2017</a:t>
+              <a:t>5/15/2017</a:t>
             </a:fld>
             <a:endParaRPr/>
           </a:p>
@@ -2827,7 +2827,7 @@
           <a:p>
             <a:fld id="{0CC3EA6D-DF0B-4D4B-B359-5F1D1D0E30A4}" type="datetime1">
               <a:rPr lang="en-US"/>
-              <a:t>5/14/2017</a:t>
+              <a:t>5/15/2017</a:t>
             </a:fld>
             <a:endParaRPr/>
           </a:p>
@@ -3431,7 +3431,7 @@
           <a:p>
             <a:fld id="{977EDB99-15BC-4479-BAC5-1E502E66917A}" type="datetime1">
               <a:rPr lang="en-US"/>
-              <a:t>5/14/2017</a:t>
+              <a:t>5/15/2017</a:t>
             </a:fld>
             <a:endParaRPr/>
           </a:p>
@@ -3743,7 +3743,7 @@
           <a:p>
             <a:fld id="{4067C2A3-CD19-48AB-9F64-ECCF75182EDD}" type="datetime1">
               <a:rPr lang="en-US"/>
-              <a:t>5/14/2017</a:t>
+              <a:t>5/15/2017</a:t>
             </a:fld>
             <a:endParaRPr/>
           </a:p>
@@ -4205,7 +4205,7 @@
           <a:p>
             <a:fld id="{0363E8C1-7C87-4705-AB97-8CD17D208E3F}" type="datetime1">
               <a:rPr lang="en-US"/>
-              <a:t>5/14/2017</a:t>
+              <a:t>5/15/2017</a:t>
             </a:fld>
             <a:endParaRPr/>
           </a:p>
@@ -4338,7 +4338,7 @@
           <a:p>
             <a:fld id="{E20C624E-DF92-4841-B9B9-DD11AA239B85}" type="datetime1">
               <a:rPr lang="en-US"/>
-              <a:t>5/14/2017</a:t>
+              <a:t>5/15/2017</a:t>
             </a:fld>
             <a:endParaRPr/>
           </a:p>
@@ -4631,7 +4631,7 @@
           <a:p>
             <a:fld id="{FBDA3AE1-4360-4D5B-BDBC-656B872DD533}" type="datetime1">
               <a:rPr lang="en-US"/>
-              <a:t>5/14/2017</a:t>
+              <a:t>5/15/2017</a:t>
             </a:fld>
             <a:endParaRPr/>
           </a:p>
@@ -4930,7 +4930,7 @@
           <a:p>
             <a:fld id="{20990708-46A4-4851-883E-8DFB8939107E}" type="datetime1">
               <a:rPr lang="en-US"/>
-              <a:t>5/14/2017</a:t>
+              <a:t>5/15/2017</a:t>
             </a:fld>
             <a:endParaRPr/>
           </a:p>
@@ -5214,7 +5214,7 @@
           <a:p>
             <a:fld id="{AE88EFFC-86AE-4294-A319-CAFC2651994B}" type="datetime1">
               <a:rPr lang="en-US"/>
-              <a:t>5/14/2017</a:t>
+              <a:t>5/15/2017</a:t>
             </a:fld>
             <a:endParaRPr/>
           </a:p>
@@ -5796,7 +5796,7 @@
             <a:fld id="{D29E8617-6EA8-4B97-A5E8-E18E98765EE2}" type="datetime1">
               <a:rPr lang="en-US"/>
               <a:pPr/>
-              <a:t>5/14/2017</a:t>
+              <a:t>5/15/2017</a:t>
             </a:fld>
             <a:endParaRPr dirty="0"/>
           </a:p>
@@ -7417,7 +7417,7 @@
           <a:p>
             <a:r>
               <a:rPr lang="en-US" dirty="0"/>
-              <a:t>Research Data</a:t>
+              <a:t>Port Source Code to New Seed Project</a:t>
             </a:r>
           </a:p>
           <a:p>
@@ -7450,7 +7450,7 @@
           <a:p>
             <a:r>
               <a:rPr lang="en-US" dirty="0"/>
-              <a:t>Achieve Full baseline functionality</a:t>
+              <a:t>Research Expiration Data</a:t>
             </a:r>
           </a:p>
         </p:txBody>
@@ -7717,7 +7717,7 @@
               <a:rPr lang="en-CA" dirty="0">
                 <a:hlinkClick r:id="rId3"/>
               </a:rPr>
-              <a:t>https://grocerybuddy-fe337.firebaseapp.com/main</a:t>
+              <a:t>https://grocerybuddy-fe337.firebaseapp.com</a:t>
             </a:r>
             <a:endParaRPr lang="en-CA" dirty="0"/>
           </a:p>
@@ -10886,15 +10886,6 @@
 </file>
 
 <file path=customXml/item2.xml><?xml version="1.0" encoding="utf-8"?>
-<?mso-contentType ?>
-<FormTemplates xmlns="http://schemas.microsoft.com/sharepoint/v3/contenttype/forms">
-  <Display>DocumentLibraryForm</Display>
-  <Edit>DocumentLibraryForm</Edit>
-  <New>DocumentLibraryForm</New>
-</FormTemplates>
-</file>
-
-<file path=customXml/item3.xml><?xml version="1.0" encoding="utf-8"?>
 <p:properties xmlns:p="http://schemas.microsoft.com/office/2006/metadata/properties" xmlns:xsi="http://www.w3.org/2001/XMLSchema-instance" xmlns:pc="http://schemas.microsoft.com/office/infopath/2007/PartnerControls">
   <documentManagement>
     <VSO_x0020_item_x0020_id xmlns="40262f94-9f35-4ac3-9a90-690165a166b7" xsi:nil="true"/>
@@ -10903,6 +10894,15 @@
     <Template_x0020_details xmlns="40262f94-9f35-4ac3-9a90-690165a166b7" xsi:nil="true"/>
   </documentManagement>
 </p:properties>
+</file>
+
+<file path=customXml/item3.xml><?xml version="1.0" encoding="utf-8"?>
+<?mso-contentType ?>
+<FormTemplates xmlns="http://schemas.microsoft.com/sharepoint/v3/contenttype/forms">
+  <Display>DocumentLibraryForm</Display>
+  <Edit>DocumentLibraryForm</Edit>
+  <New>DocumentLibraryForm</New>
+</FormTemplates>
 </file>
 
 <file path=customXml/itemProps1.xml><?xml version="1.0" encoding="utf-8"?>
@@ -10925,14 +10925,6 @@
 </file>
 
 <file path=customXml/itemProps2.xml><?xml version="1.0" encoding="utf-8"?>
-<ds:datastoreItem xmlns:ds="http://schemas.openxmlformats.org/officeDocument/2006/customXml" ds:itemID="{308942AA-0721-4324-BC2C-A3CB43F24E71}">
-  <ds:schemaRefs>
-    <ds:schemaRef ds:uri="http://schemas.microsoft.com/sharepoint/v3/contenttype/forms"/>
-  </ds:schemaRefs>
-</ds:datastoreItem>
-</file>
-
-<file path=customXml/itemProps3.xml><?xml version="1.0" encoding="utf-8"?>
 <ds:datastoreItem xmlns:ds="http://schemas.openxmlformats.org/officeDocument/2006/customXml" ds:itemID="{5E700CCB-20BA-4760-AB9F-AC3B63ED32E0}">
   <ds:schemaRefs>
     <ds:schemaRef ds:uri="http://purl.org/dc/terms/"/>
@@ -10947,4 +10939,12 @@
     <ds:schemaRef ds:uri="http://www.w3.org/XML/1998/namespace"/>
   </ds:schemaRefs>
 </ds:datastoreItem>
+</file>
+
+<file path=customXml/itemProps3.xml><?xml version="1.0" encoding="utf-8"?>
+<ds:datastoreItem xmlns:ds="http://schemas.openxmlformats.org/officeDocument/2006/customXml" ds:itemID="{308942AA-0721-4324-BC2C-A3CB43F24E71}">
+  <ds:schemaRefs>
+    <ds:schemaRef ds:uri="http://schemas.microsoft.com/sharepoint/v3/contenttype/forms"/>
+  </ds:schemaRefs>
+</ds:datastoreItem>
 </file>
</xml_diff>